<commit_message>
Updated documentation folder with content from b95dfac7462eb082e5e40228a9904131a8d87e91 of docs master branch
</commit_message>
<xml_diff>
--- a/documentation/images/openbaton-stencils.pptx
+++ b/documentation/images/openbaton-stencils.pptx
@@ -112,6 +112,22 @@
       </a:defRPr>
     </a:lvl9pPr>
   </p:defaultTextStyle>
+  <p:extLst>
+    <p:ext uri="{EFAFB233-063F-42B5-8137-9DF3F51BA10A}">
+      <p15:sldGuideLst xmlns:p15="http://schemas.microsoft.com/office/powerpoint/2012/main">
+        <p15:guide id="1" orient="horz" pos="2160">
+          <p15:clr>
+            <a:srgbClr val="A4A3A4"/>
+          </p15:clr>
+        </p15:guide>
+        <p15:guide id="2" pos="2880">
+          <p15:clr>
+            <a:srgbClr val="A4A3A4"/>
+          </p15:clr>
+        </p15:guide>
+      </p15:sldGuideLst>
+    </p:ext>
+  </p:extLst>
 </p:presentation>
 </file>
 
@@ -296,7 +312,7 @@
           <a:p>
             <a:fld id="{14A7C45A-EC31-C341-BCBA-1394489C9760}" type="datetimeFigureOut">
               <a:rPr lang="en-US" smtClean="0"/>
-              <a:t>21/10/15</a:t>
+              <a:t>7/14/16</a:t>
             </a:fld>
             <a:endParaRPr lang="en-US"/>
           </a:p>
@@ -466,7 +482,7 @@
           <a:p>
             <a:fld id="{14A7C45A-EC31-C341-BCBA-1394489C9760}" type="datetimeFigureOut">
               <a:rPr lang="en-US" smtClean="0"/>
-              <a:t>21/10/15</a:t>
+              <a:t>7/14/16</a:t>
             </a:fld>
             <a:endParaRPr lang="en-US"/>
           </a:p>
@@ -646,7 +662,7 @@
           <a:p>
             <a:fld id="{14A7C45A-EC31-C341-BCBA-1394489C9760}" type="datetimeFigureOut">
               <a:rPr lang="en-US" smtClean="0"/>
-              <a:t>21/10/15</a:t>
+              <a:t>7/14/16</a:t>
             </a:fld>
             <a:endParaRPr lang="en-US"/>
           </a:p>
@@ -816,7 +832,7 @@
           <a:p>
             <a:fld id="{14A7C45A-EC31-C341-BCBA-1394489C9760}" type="datetimeFigureOut">
               <a:rPr lang="en-US" smtClean="0"/>
-              <a:t>21/10/15</a:t>
+              <a:t>7/14/16</a:t>
             </a:fld>
             <a:endParaRPr lang="en-US"/>
           </a:p>
@@ -1062,7 +1078,7 @@
           <a:p>
             <a:fld id="{14A7C45A-EC31-C341-BCBA-1394489C9760}" type="datetimeFigureOut">
               <a:rPr lang="en-US" smtClean="0"/>
-              <a:t>21/10/15</a:t>
+              <a:t>7/14/16</a:t>
             </a:fld>
             <a:endParaRPr lang="en-US"/>
           </a:p>
@@ -1350,7 +1366,7 @@
           <a:p>
             <a:fld id="{14A7C45A-EC31-C341-BCBA-1394489C9760}" type="datetimeFigureOut">
               <a:rPr lang="en-US" smtClean="0"/>
-              <a:t>21/10/15</a:t>
+              <a:t>7/14/16</a:t>
             </a:fld>
             <a:endParaRPr lang="en-US"/>
           </a:p>
@@ -1772,7 +1788,7 @@
           <a:p>
             <a:fld id="{14A7C45A-EC31-C341-BCBA-1394489C9760}" type="datetimeFigureOut">
               <a:rPr lang="en-US" smtClean="0"/>
-              <a:t>21/10/15</a:t>
+              <a:t>7/14/16</a:t>
             </a:fld>
             <a:endParaRPr lang="en-US"/>
           </a:p>
@@ -1890,7 +1906,7 @@
           <a:p>
             <a:fld id="{14A7C45A-EC31-C341-BCBA-1394489C9760}" type="datetimeFigureOut">
               <a:rPr lang="en-US" smtClean="0"/>
-              <a:t>21/10/15</a:t>
+              <a:t>7/14/16</a:t>
             </a:fld>
             <a:endParaRPr lang="en-US"/>
           </a:p>
@@ -1985,7 +2001,7 @@
           <a:p>
             <a:fld id="{14A7C45A-EC31-C341-BCBA-1394489C9760}" type="datetimeFigureOut">
               <a:rPr lang="en-US" smtClean="0"/>
-              <a:t>21/10/15</a:t>
+              <a:t>7/14/16</a:t>
             </a:fld>
             <a:endParaRPr lang="en-US"/>
           </a:p>
@@ -2262,7 +2278,7 @@
           <a:p>
             <a:fld id="{14A7C45A-EC31-C341-BCBA-1394489C9760}" type="datetimeFigureOut">
               <a:rPr lang="en-US" smtClean="0"/>
-              <a:t>21/10/15</a:t>
+              <a:t>7/14/16</a:t>
             </a:fld>
             <a:endParaRPr lang="en-US"/>
           </a:p>
@@ -2515,7 +2531,7 @@
           <a:p>
             <a:fld id="{14A7C45A-EC31-C341-BCBA-1394489C9760}" type="datetimeFigureOut">
               <a:rPr lang="en-US" smtClean="0"/>
-              <a:t>21/10/15</a:t>
+              <a:t>7/14/16</a:t>
             </a:fld>
             <a:endParaRPr lang="en-US"/>
           </a:p>
@@ -2728,7 +2744,7 @@
           <a:p>
             <a:fld id="{14A7C45A-EC31-C341-BCBA-1394489C9760}" type="datetimeFigureOut">
               <a:rPr lang="en-US" smtClean="0"/>
-              <a:t>21/10/15</a:t>
+              <a:t>7/14/16</a:t>
             </a:fld>
             <a:endParaRPr lang="en-US"/>
           </a:p>
@@ -13289,8 +13305,8 @@
         </p:nvSpPr>
         <p:spPr>
           <a:xfrm>
-            <a:off x="3057123" y="780708"/>
-            <a:ext cx="2162611" cy="2213164"/>
+            <a:off x="2541319" y="780708"/>
+            <a:ext cx="3063834" cy="2213164"/>
           </a:xfrm>
           <a:prstGeom prst="roundRect">
             <a:avLst>
@@ -13328,7 +13344,7 @@
               </a:spcAft>
             </a:pPr>
             <a:r>
-              <a:rPr lang="en-US" sz="1400" kern="0" dirty="0" smtClean="0">
+              <a:rPr lang="en-US" sz="1400" kern="0" dirty="0">
                 <a:solidFill>
                   <a:prstClr val="black">
                     <a:lumMod val="85000"/>
@@ -13338,7 +13354,7 @@
                 <a:latin typeface="Tahoma"/>
                 <a:ea typeface="ＭＳ Ｐゴシック" pitchFamily="46" charset="-128"/>
               </a:rPr>
-              <a:t>JMS Queues</a:t>
+              <a:t>Rabbit AMQP</a:t>
             </a:r>
             <a:endParaRPr lang="en-US" sz="1400" kern="0" dirty="0">
               <a:solidFill>
@@ -13361,7 +13377,7 @@
         </p:nvGrpSpPr>
         <p:grpSpPr>
           <a:xfrm>
-            <a:off x="764897" y="1111394"/>
+            <a:off x="384887" y="1180659"/>
             <a:ext cx="1620510" cy="1049808"/>
             <a:chOff x="6842942" y="1914255"/>
             <a:chExt cx="1620510" cy="1049808"/>
@@ -13463,8 +13479,8 @@
         </p:nvSpPr>
         <p:spPr>
           <a:xfrm rot="16200000" flipH="1">
-            <a:off x="3971916" y="633378"/>
-            <a:ext cx="383252" cy="1594223"/>
+            <a:off x="4717964" y="1273729"/>
+            <a:ext cx="383252" cy="863668"/>
           </a:xfrm>
           <a:prstGeom prst="can">
             <a:avLst/>
@@ -13540,8 +13556,8 @@
         </p:nvCxnSpPr>
         <p:spPr>
           <a:xfrm>
-            <a:off x="4960654" y="1430490"/>
-            <a:ext cx="980709" cy="275073"/>
+            <a:off x="5341424" y="1705563"/>
+            <a:ext cx="599939" cy="0"/>
           </a:xfrm>
           <a:prstGeom prst="straightConnector1">
             <a:avLst/>
@@ -13550,7 +13566,7 @@
             <a:solidFill>
               <a:srgbClr val="E68F00"/>
             </a:solidFill>
-            <a:headEnd type="none" w="med" len="med"/>
+            <a:headEnd type="triangle" w="med" len="med"/>
             <a:tailEnd type="triangle" w="med" len="med"/>
           </a:ln>
         </p:spPr>
@@ -13624,80 +13640,6 @@
           </a:p>
         </p:txBody>
       </p:sp>
-      <p:sp>
-        <p:nvSpPr>
-          <p:cNvPr id="16" name="Can 15"/>
-          <p:cNvSpPr/>
-          <p:nvPr/>
-        </p:nvSpPr>
-        <p:spPr>
-          <a:xfrm rot="5400000">
-            <a:off x="3971915" y="1281805"/>
-            <a:ext cx="383252" cy="1594223"/>
-          </a:xfrm>
-          <a:prstGeom prst="can">
-            <a:avLst/>
-          </a:prstGeom>
-          <a:solidFill>
-            <a:schemeClr val="bg1"/>
-          </a:solidFill>
-          <a:ln w="6350" cap="flat" cmpd="sng" algn="ctr">
-            <a:solidFill>
-              <a:schemeClr val="tx1">
-                <a:lumMod val="65000"/>
-                <a:lumOff val="35000"/>
-              </a:schemeClr>
-            </a:solidFill>
-            <a:prstDash val="solid"/>
-            <a:round/>
-            <a:headEnd type="none" w="med" len="med"/>
-            <a:tailEnd type="none" w="med" len="med"/>
-          </a:ln>
-          <a:effectLst>
-            <a:outerShdw blurRad="190500" dist="25400" dir="2700000">
-              <a:srgbClr val="000000">
-                <a:alpha val="43000"/>
-              </a:srgbClr>
-            </a:outerShdw>
-          </a:effectLst>
-        </p:spPr>
-        <p:txBody>
-          <a:bodyPr rtlCol="0" anchor="ctr"/>
-          <a:lstStyle/>
-          <a:p>
-            <a:pPr marL="0" marR="0" indent="0" algn="ctr" defTabSz="914400" eaLnBrk="1" fontAlgn="auto" latinLnBrk="0" hangingPunct="1">
-              <a:lnSpc>
-                <a:spcPct val="100000"/>
-              </a:lnSpc>
-              <a:spcBef>
-                <a:spcPts val="0"/>
-              </a:spcBef>
-              <a:spcAft>
-                <a:spcPts val="0"/>
-              </a:spcAft>
-              <a:buClrTx/>
-              <a:buSzTx/>
-              <a:buFontTx/>
-              <a:buNone/>
-              <a:tabLst/>
-            </a:pPr>
-            <a:endParaRPr kumimoji="0" lang="en-US" sz="1800" b="0" i="0" u="none" strike="noStrike" kern="0" cap="none" spc="0" normalizeH="0" baseline="0" noProof="0">
-              <a:ln>
-                <a:noFill/>
-              </a:ln>
-              <a:solidFill>
-                <a:sysClr val="window" lastClr="FFFFFF"/>
-              </a:solidFill>
-              <a:effectLst/>
-              <a:uLnTx/>
-              <a:uFillTx/>
-              <a:latin typeface="Tahoma"/>
-              <a:ea typeface="+mn-ea"/>
-              <a:cs typeface="+mn-cs"/>
-            </a:endParaRPr>
-          </a:p>
-        </p:txBody>
-      </p:sp>
       <p:cxnSp>
         <p:nvCxnSpPr>
           <p:cNvPr id="19" name="Elbow Connector 21"/>
@@ -13708,8 +13650,8 @@
         </p:nvCxnSpPr>
         <p:spPr>
           <a:xfrm flipV="1">
-            <a:off x="2385407" y="1430490"/>
-            <a:ext cx="981022" cy="205808"/>
+            <a:off x="2005397" y="1705562"/>
+            <a:ext cx="863668" cy="1"/>
           </a:xfrm>
           <a:prstGeom prst="straightConnector1">
             <a:avLst/>
@@ -13718,7 +13660,7 @@
             <a:solidFill>
               <a:srgbClr val="E68F00"/>
             </a:solidFill>
-            <a:headEnd type="none" w="med" len="med"/>
+            <a:headEnd type="triangle" w="med" len="med"/>
             <a:tailEnd type="triangle" w="med" len="med"/>
           </a:ln>
         </p:spPr>
@@ -13737,19 +13679,78 @@
           </a:fontRef>
         </p:style>
       </p:cxnSp>
+      <p:sp>
+        <p:nvSpPr>
+          <p:cNvPr id="18" name="Can 17"/>
+          <p:cNvSpPr/>
+          <p:nvPr/>
+        </p:nvSpPr>
+        <p:spPr>
+          <a:xfrm>
+            <a:off x="2869065" y="1570836"/>
+            <a:ext cx="630925" cy="269453"/>
+          </a:xfrm>
+          <a:prstGeom prst="can">
+            <a:avLst>
+              <a:gd name="adj" fmla="val 50000"/>
+            </a:avLst>
+          </a:prstGeom>
+          <a:gradFill>
+            <a:gsLst>
+              <a:gs pos="100000">
+                <a:schemeClr val="bg1"/>
+              </a:gs>
+              <a:gs pos="100000">
+                <a:schemeClr val="accent1">
+                  <a:tint val="50000"/>
+                  <a:shade val="100000"/>
+                  <a:satMod val="350000"/>
+                </a:schemeClr>
+              </a:gs>
+            </a:gsLst>
+          </a:gradFill>
+          <a:ln>
+            <a:solidFill>
+              <a:schemeClr val="tx1"/>
+            </a:solidFill>
+          </a:ln>
+        </p:spPr>
+        <p:style>
+          <a:lnRef idx="1">
+            <a:schemeClr val="accent1"/>
+          </a:lnRef>
+          <a:fillRef idx="3">
+            <a:schemeClr val="accent1"/>
+          </a:fillRef>
+          <a:effectRef idx="2">
+            <a:schemeClr val="accent1"/>
+          </a:effectRef>
+          <a:fontRef idx="minor">
+            <a:schemeClr val="lt1"/>
+          </a:fontRef>
+        </p:style>
+        <p:txBody>
+          <a:bodyPr rtlCol="0" anchor="ctr"/>
+          <a:lstStyle/>
+          <a:p>
+            <a:pPr algn="ctr"/>
+            <a:endParaRPr lang="en-US"/>
+          </a:p>
+        </p:txBody>
+      </p:sp>
       <p:cxnSp>
         <p:nvCxnSpPr>
-          <p:cNvPr id="22" name="Elbow Connector 21"/>
+          <p:cNvPr id="24" name="Elbow Connector 21"/>
           <p:cNvCxnSpPr>
-            <a:stCxn id="16" idx="3"/>
-            <a:endCxn id="3" idx="3"/>
+            <a:stCxn id="18" idx="4"/>
+            <a:endCxn id="9" idx="1"/>
           </p:cNvCxnSpPr>
           <p:nvPr/>
         </p:nvCxnSpPr>
         <p:spPr>
-          <a:xfrm flipH="1" flipV="1">
-            <a:off x="2385407" y="1636298"/>
-            <a:ext cx="981023" cy="442619"/>
+          <a:xfrm>
+            <a:off x="3499990" y="1705563"/>
+            <a:ext cx="977766" cy="0"/>
           </a:xfrm>
           <a:prstGeom prst="straightConnector1">
             <a:avLst/>
@@ -13758,7 +13759,7 @@
             <a:solidFill>
               <a:srgbClr val="E68F00"/>
             </a:solidFill>
-            <a:headEnd type="none" w="med" len="med"/>
+            <a:headEnd type="triangle" w="med" len="med"/>
             <a:tailEnd type="triangle" w="med" len="med"/>
           </a:ln>
         </p:spPr>
@@ -13777,46 +13778,66 @@
           </a:fontRef>
         </p:style>
       </p:cxnSp>
-      <p:cxnSp>
-        <p:nvCxnSpPr>
-          <p:cNvPr id="25" name="Elbow Connector 21"/>
-          <p:cNvCxnSpPr>
-            <a:stCxn id="15" idx="1"/>
-            <a:endCxn id="16" idx="1"/>
-          </p:cNvCxnSpPr>
-          <p:nvPr/>
-        </p:nvCxnSpPr>
-        <p:spPr>
-          <a:xfrm flipH="1">
-            <a:off x="4960653" y="1705563"/>
-            <a:ext cx="980710" cy="373354"/>
-          </a:xfrm>
-          <a:prstGeom prst="straightConnector1">
-            <a:avLst/>
-          </a:prstGeom>
-          <a:ln w="57150">
-            <a:solidFill>
-              <a:srgbClr val="E68F00"/>
-            </a:solidFill>
-            <a:headEnd type="none" w="med" len="med"/>
-            <a:tailEnd type="triangle" w="med" len="med"/>
-          </a:ln>
-        </p:spPr>
-        <p:style>
-          <a:lnRef idx="2">
-            <a:schemeClr val="accent4"/>
-          </a:lnRef>
-          <a:fillRef idx="1">
-            <a:schemeClr val="lt1"/>
-          </a:fillRef>
-          <a:effectRef idx="0">
-            <a:schemeClr val="accent4"/>
-          </a:effectRef>
-          <a:fontRef idx="minor">
-            <a:schemeClr val="dk1"/>
-          </a:fontRef>
-        </p:style>
-      </p:cxnSp>
+      <p:sp>
+        <p:nvSpPr>
+          <p:cNvPr id="26" name="TextBox 25"/>
+          <p:cNvSpPr txBox="1"/>
+          <p:nvPr/>
+        </p:nvSpPr>
+        <p:spPr>
+          <a:xfrm>
+            <a:off x="2700499" y="1887290"/>
+            <a:ext cx="1072768" cy="369332"/>
+          </a:xfrm>
+          <a:prstGeom prst="rect">
+            <a:avLst/>
+          </a:prstGeom>
+          <a:noFill/>
+        </p:spPr>
+        <p:txBody>
+          <a:bodyPr wrap="square" rtlCol="0">
+            <a:spAutoFit/>
+          </a:bodyPr>
+          <a:lstStyle/>
+          <a:p>
+            <a:r>
+              <a:rPr lang="en-US" smtClean="0"/>
+              <a:t>exchange</a:t>
+            </a:r>
+            <a:endParaRPr lang="en-US" dirty="0"/>
+          </a:p>
+        </p:txBody>
+      </p:sp>
+      <p:sp>
+        <p:nvSpPr>
+          <p:cNvPr id="29" name="TextBox 28"/>
+          <p:cNvSpPr txBox="1"/>
+          <p:nvPr/>
+        </p:nvSpPr>
+        <p:spPr>
+          <a:xfrm>
+            <a:off x="4477756" y="1891440"/>
+            <a:ext cx="978540" cy="369332"/>
+          </a:xfrm>
+          <a:prstGeom prst="rect">
+            <a:avLst/>
+          </a:prstGeom>
+          <a:noFill/>
+        </p:spPr>
+        <p:txBody>
+          <a:bodyPr wrap="square" rtlCol="0">
+            <a:spAutoFit/>
+          </a:bodyPr>
+          <a:lstStyle/>
+          <a:p>
+            <a:r>
+              <a:rPr lang="en-US" smtClean="0"/>
+              <a:t>queue</a:t>
+            </a:r>
+            <a:endParaRPr lang="en-US" dirty="0"/>
+          </a:p>
+        </p:txBody>
+      </p:sp>
     </p:spTree>
     <p:extLst>
       <p:ext uri="{BB962C8B-B14F-4D97-AF65-F5344CB8AC3E}">
@@ -13855,8 +13876,8 @@
         </p:nvSpPr>
         <p:spPr>
           <a:xfrm>
-            <a:off x="3879347" y="1398968"/>
-            <a:ext cx="2162611" cy="4072078"/>
+            <a:off x="3455719" y="1398968"/>
+            <a:ext cx="2586239" cy="4072078"/>
           </a:xfrm>
           <a:prstGeom prst="roundRect">
             <a:avLst>
@@ -13904,7 +13925,7 @@
                 <a:latin typeface="Tahoma"/>
                 <a:ea typeface="ＭＳ Ｐゴシック" pitchFamily="46" charset="-128"/>
               </a:rPr>
-              <a:t>JMS Queues</a:t>
+              <a:t>Rabbit AMQP</a:t>
             </a:r>
             <a:endParaRPr lang="en-US" sz="1400" kern="0" dirty="0">
               <a:solidFill>
@@ -13982,8 +14003,8 @@
         </p:nvSpPr>
         <p:spPr>
           <a:xfrm rot="5400000">
-            <a:off x="4674973" y="1316614"/>
-            <a:ext cx="383252" cy="1594223"/>
+            <a:off x="3762857" y="1609366"/>
+            <a:ext cx="383252" cy="997528"/>
           </a:xfrm>
           <a:prstGeom prst="can">
             <a:avLst/>
@@ -14070,14 +14091,14 @@
           <p:cNvPr id="25" name="Elbow Connector 21"/>
           <p:cNvCxnSpPr>
             <a:stCxn id="15" idx="1"/>
-            <a:endCxn id="16" idx="1"/>
+            <a:endCxn id="26" idx="4"/>
           </p:cNvCxnSpPr>
           <p:nvPr/>
         </p:nvCxnSpPr>
         <p:spPr>
-          <a:xfrm flipH="1" flipV="1">
-            <a:off x="5663711" y="2113726"/>
-            <a:ext cx="1200100" cy="1046540"/>
+          <a:xfrm flipH="1">
+            <a:off x="5821606" y="3160266"/>
+            <a:ext cx="1042205" cy="4686"/>
           </a:xfrm>
           <a:prstGeom prst="straightConnector1">
             <a:avLst/>
@@ -14623,7 +14644,7 @@
         <p:spPr>
           <a:xfrm flipH="1" flipV="1">
             <a:off x="2642135" y="2108129"/>
-            <a:ext cx="1427353" cy="5597"/>
+            <a:ext cx="813584" cy="1"/>
           </a:xfrm>
           <a:prstGeom prst="straightConnector1">
             <a:avLst/>
@@ -14659,8 +14680,8 @@
         </p:nvSpPr>
         <p:spPr>
           <a:xfrm rot="5400000">
-            <a:off x="4674972" y="3589636"/>
-            <a:ext cx="383252" cy="1594223"/>
+            <a:off x="3762857" y="3871047"/>
+            <a:ext cx="383252" cy="997528"/>
           </a:xfrm>
           <a:prstGeom prst="can">
             <a:avLst/>
@@ -14744,17 +14765,146 @@
       </p:sp>
       <p:cxnSp>
         <p:nvCxnSpPr>
-          <p:cNvPr id="48" name="Elbow Connector 21"/>
+          <p:cNvPr id="51" name="Elbow Connector 21"/>
           <p:cNvCxnSpPr>
-            <a:stCxn id="15" idx="1"/>
+            <a:stCxn id="47" idx="3"/>
+            <a:endCxn id="42" idx="3"/>
+          </p:cNvCxnSpPr>
+          <p:nvPr/>
+        </p:nvCxnSpPr>
+        <p:spPr>
+          <a:xfrm flipH="1" flipV="1">
+            <a:off x="2642135" y="4369810"/>
+            <a:ext cx="813584" cy="1"/>
+          </a:xfrm>
+          <a:prstGeom prst="straightConnector1">
+            <a:avLst/>
+          </a:prstGeom>
+          <a:ln w="57150">
+            <a:solidFill>
+              <a:srgbClr val="E68F00"/>
+            </a:solidFill>
+            <a:headEnd type="triangle" w="med" len="med"/>
+            <a:tailEnd type="triangle" w="med" len="med"/>
+          </a:ln>
+        </p:spPr>
+        <p:style>
+          <a:lnRef idx="2">
+            <a:schemeClr val="accent4"/>
+          </a:lnRef>
+          <a:fillRef idx="1">
+            <a:schemeClr val="lt1"/>
+          </a:fillRef>
+          <a:effectRef idx="0">
+            <a:schemeClr val="accent4"/>
+          </a:effectRef>
+          <a:fontRef idx="minor">
+            <a:schemeClr val="dk1"/>
+          </a:fontRef>
+        </p:style>
+      </p:cxnSp>
+      <p:sp>
+        <p:nvSpPr>
+          <p:cNvPr id="26" name="Can 25"/>
+          <p:cNvSpPr/>
+          <p:nvPr/>
+        </p:nvSpPr>
+        <p:spPr>
+          <a:xfrm>
+            <a:off x="5190681" y="3006725"/>
+            <a:ext cx="630925" cy="316454"/>
+          </a:xfrm>
+          <a:prstGeom prst="can">
+            <a:avLst>
+              <a:gd name="adj" fmla="val 50000"/>
+            </a:avLst>
+          </a:prstGeom>
+          <a:gradFill>
+            <a:gsLst>
+              <a:gs pos="100000">
+                <a:schemeClr val="bg1"/>
+              </a:gs>
+              <a:gs pos="100000">
+                <a:schemeClr val="accent1">
+                  <a:tint val="50000"/>
+                  <a:shade val="100000"/>
+                  <a:satMod val="350000"/>
+                </a:schemeClr>
+              </a:gs>
+            </a:gsLst>
+          </a:gradFill>
+          <a:ln>
+            <a:solidFill>
+              <a:schemeClr val="tx1"/>
+            </a:solidFill>
+          </a:ln>
+        </p:spPr>
+        <p:style>
+          <a:lnRef idx="1">
+            <a:schemeClr val="accent1"/>
+          </a:lnRef>
+          <a:fillRef idx="3">
+            <a:schemeClr val="accent1"/>
+          </a:fillRef>
+          <a:effectRef idx="2">
+            <a:schemeClr val="accent1"/>
+          </a:effectRef>
+          <a:fontRef idx="minor">
+            <a:schemeClr val="lt1"/>
+          </a:fontRef>
+        </p:style>
+        <p:txBody>
+          <a:bodyPr rtlCol="0" anchor="ctr"/>
+          <a:lstStyle/>
+          <a:p>
+            <a:pPr algn="ctr"/>
+            <a:endParaRPr lang="en-US"/>
+          </a:p>
+        </p:txBody>
+      </p:sp>
+      <p:sp>
+        <p:nvSpPr>
+          <p:cNvPr id="27" name="TextBox 26"/>
+          <p:cNvSpPr txBox="1"/>
+          <p:nvPr/>
+        </p:nvSpPr>
+        <p:spPr>
+          <a:xfrm>
+            <a:off x="4991870" y="3301426"/>
+            <a:ext cx="1072768" cy="369332"/>
+          </a:xfrm>
+          <a:prstGeom prst="rect">
+            <a:avLst/>
+          </a:prstGeom>
+          <a:noFill/>
+        </p:spPr>
+        <p:txBody>
+          <a:bodyPr wrap="square" rtlCol="0">
+            <a:spAutoFit/>
+          </a:bodyPr>
+          <a:lstStyle/>
+          <a:p>
+            <a:r>
+              <a:rPr lang="en-US" smtClean="0"/>
+              <a:t>exchange</a:t>
+            </a:r>
+            <a:endParaRPr lang="en-US" dirty="0"/>
+          </a:p>
+        </p:txBody>
+      </p:sp>
+      <p:cxnSp>
+        <p:nvCxnSpPr>
+          <p:cNvPr id="30" name="Elbow Connector 21"/>
+          <p:cNvCxnSpPr>
+            <a:stCxn id="26" idx="2"/>
             <a:endCxn id="47" idx="1"/>
           </p:cNvCxnSpPr>
           <p:nvPr/>
         </p:nvCxnSpPr>
         <p:spPr>
           <a:xfrm flipH="1">
-            <a:off x="5663710" y="3160266"/>
-            <a:ext cx="1200101" cy="1226482"/>
+            <a:off x="4453247" y="3164952"/>
+            <a:ext cx="737434" cy="1204859"/>
           </a:xfrm>
           <a:prstGeom prst="straightConnector1">
             <a:avLst/>
@@ -14784,17 +14934,17 @@
       </p:cxnSp>
       <p:cxnSp>
         <p:nvCxnSpPr>
-          <p:cNvPr id="51" name="Elbow Connector 21"/>
+          <p:cNvPr id="36" name="Elbow Connector 21"/>
           <p:cNvCxnSpPr>
-            <a:stCxn id="47" idx="3"/>
-            <a:endCxn id="42" idx="3"/>
+            <a:stCxn id="26" idx="2"/>
+            <a:endCxn id="16" idx="1"/>
           </p:cNvCxnSpPr>
           <p:nvPr/>
         </p:nvCxnSpPr>
         <p:spPr>
           <a:xfrm flipH="1" flipV="1">
-            <a:off x="2642135" y="4369810"/>
-            <a:ext cx="1427352" cy="16938"/>
+            <a:off x="4453247" y="2108130"/>
+            <a:ext cx="737434" cy="1056822"/>
           </a:xfrm>
           <a:prstGeom prst="straightConnector1">
             <a:avLst/>

</xml_diff>